<commit_message>
updated for June 2023 class
</commit_message>
<xml_diff>
--- a/Lectures/Session 13 Material/S13.MediationLecture2.pptx
+++ b/Lectures/Session 13 Material/S13.MediationLecture2.pptx
@@ -246,7 +246,7 @@
             <a:fld id="{5716E9E5-287C-4A17-9ED7-3172FC57F926}" type="datetimeFigureOut">
               <a:rPr lang="en-US" smtClean="0"/>
               <a:pPr/>
-              <a:t>1/19/23</a:t>
+              <a:t>6/4/23</a:t>
             </a:fld>
             <a:endParaRPr lang="en-US"/>
           </a:p>
@@ -1955,7 +1955,7 @@
           <a:p>
             <a:fld id="{0D9AD1BE-5587-6C4B-8900-F8665D3E3130}" type="datetimeFigureOut">
               <a:rPr lang="en-US" smtClean="0"/>
-              <a:t>1/19/23</a:t>
+              <a:t>6/4/23</a:t>
             </a:fld>
             <a:endParaRPr lang="en-US"/>
           </a:p>
@@ -2362,7 +2362,7 @@
                 <a:latin typeface="Arial" panose="020B0604020202020204" pitchFamily="34" charset="0"/>
                 <a:cs typeface="Arial" panose="020B0604020202020204" pitchFamily="34" charset="0"/>
               </a:rPr>
-              <a:t>June 22-24, 2022</a:t>
+              <a:t>June 7-9, 2023</a:t>
             </a:r>
           </a:p>
         </p:txBody>

</xml_diff>

<commit_message>
Updated files from June 2023 boot camp
</commit_message>
<xml_diff>
--- a/Lectures/Session 13 Material/S13.MediationLecture2.pptx
+++ b/Lectures/Session 13 Material/S13.MediationLecture2.pptx
@@ -246,7 +246,7 @@
             <a:fld id="{5716E9E5-287C-4A17-9ED7-3172FC57F926}" type="datetimeFigureOut">
               <a:rPr lang="en-US" smtClean="0"/>
               <a:pPr/>
-              <a:t>6/4/23</a:t>
+              <a:t>6/9/23</a:t>
             </a:fld>
             <a:endParaRPr lang="en-US"/>
           </a:p>
@@ -1955,7 +1955,7 @@
           <a:p>
             <a:fld id="{0D9AD1BE-5587-6C4B-8900-F8665D3E3130}" type="datetimeFigureOut">
               <a:rPr lang="en-US" smtClean="0"/>
-              <a:t>6/4/23</a:t>
+              <a:t>6/9/23</a:t>
             </a:fld>
             <a:endParaRPr lang="en-US"/>
           </a:p>
@@ -9402,6 +9402,55 @@
           </a:prstGeom>
         </p:spPr>
       </p:pic>
+      <p:sp>
+        <p:nvSpPr>
+          <p:cNvPr id="3" name="TextBox 2">
+            <a:extLst>
+              <a:ext uri="{FF2B5EF4-FFF2-40B4-BE49-F238E27FC236}">
+                <a16:creationId xmlns:a16="http://schemas.microsoft.com/office/drawing/2014/main" id="{F0E6C3F4-D84D-B170-8EE6-21B0EF610CBE}"/>
+              </a:ext>
+            </a:extLst>
+          </p:cNvPr>
+          <p:cNvSpPr txBox="1"/>
+          <p:nvPr/>
+        </p:nvSpPr>
+        <p:spPr>
+          <a:xfrm>
+            <a:off x="4301029" y="4357718"/>
+            <a:ext cx="1717137" cy="307777"/>
+          </a:xfrm>
+          <a:prstGeom prst="rect">
+            <a:avLst/>
+          </a:prstGeom>
+          <a:noFill/>
+        </p:spPr>
+        <p:txBody>
+          <a:bodyPr wrap="none" rtlCol="0">
+            <a:spAutoFit/>
+          </a:bodyPr>
+          <a:lstStyle/>
+          <a:p>
+            <a:r>
+              <a:rPr lang="en-US" sz="1400" dirty="0" err="1">
+                <a:latin typeface="Arial" panose="020B0604020202020204" pitchFamily="34" charset="0"/>
+                <a:cs typeface="Arial" panose="020B0604020202020204" pitchFamily="34" charset="0"/>
+              </a:rPr>
+              <a:t>Scrucca</a:t>
+            </a:r>
+            <a:r>
+              <a:rPr lang="en-US" sz="1400" dirty="0">
+                <a:latin typeface="Arial" panose="020B0604020202020204" pitchFamily="34" charset="0"/>
+                <a:cs typeface="Arial" panose="020B0604020202020204" pitchFamily="34" charset="0"/>
+              </a:rPr>
+              <a:t> et al. 2016</a:t>
+            </a:r>
+            <a:endParaRPr lang="en-US" sz="1400" i="1" dirty="0">
+              <a:latin typeface="Arial" panose="020B0604020202020204" pitchFamily="34" charset="0"/>
+              <a:cs typeface="Arial" panose="020B0604020202020204" pitchFamily="34" charset="0"/>
+            </a:endParaRPr>
+          </a:p>
+        </p:txBody>
+      </p:sp>
     </p:spTree>
     <p:extLst>
       <p:ext uri="{BB962C8B-B14F-4D97-AF65-F5344CB8AC3E}">
@@ -10606,8 +10655,8 @@
         </p:nvSpPr>
         <p:spPr>
           <a:xfrm>
-            <a:off x="1638121" y="4720910"/>
-            <a:ext cx="2662908" cy="307777"/>
+            <a:off x="1843014" y="4705281"/>
+            <a:ext cx="1717137" cy="307777"/>
           </a:xfrm>
           <a:prstGeom prst="rect">
             <a:avLst/>
@@ -10621,24 +10670,14 @@
           <a:lstStyle/>
           <a:p>
             <a:r>
-              <a:rPr lang="en-US" sz="1400" dirty="0">
+              <a:rPr lang="en-US" sz="1400" dirty="0" err="1">
                 <a:solidFill>
                   <a:schemeClr val="bg1"/>
                 </a:solidFill>
                 <a:latin typeface="Arial" panose="020B0604020202020204" pitchFamily="34" charset="0"/>
                 <a:cs typeface="Arial" panose="020B0604020202020204" pitchFamily="34" charset="0"/>
               </a:rPr>
-              <a:t>Peng et al. </a:t>
-            </a:r>
-            <a:r>
-              <a:rPr lang="en-US" sz="1400" i="1" dirty="0">
-                <a:solidFill>
-                  <a:schemeClr val="bg1"/>
-                </a:solidFill>
-                <a:latin typeface="Arial" panose="020B0604020202020204" pitchFamily="34" charset="0"/>
-                <a:cs typeface="Arial" panose="020B0604020202020204" pitchFamily="34" charset="0"/>
-              </a:rPr>
-              <a:t>Bioinformatics</a:t>
+              <a:t>Scrucca</a:t>
             </a:r>
             <a:r>
               <a:rPr lang="en-US" sz="1400" dirty="0">
@@ -10648,7 +10687,7 @@
                 <a:latin typeface="Arial" panose="020B0604020202020204" pitchFamily="34" charset="0"/>
                 <a:cs typeface="Arial" panose="020B0604020202020204" pitchFamily="34" charset="0"/>
               </a:rPr>
-              <a:t> 2019</a:t>
+              <a:t> et al. 2016</a:t>
             </a:r>
             <a:endParaRPr lang="en-US" sz="1400" i="1" dirty="0">
               <a:solidFill>
@@ -12503,74 +12542,6 @@
           </p:txBody>
         </p:sp>
       </p:grpSp>
-      <p:sp>
-        <p:nvSpPr>
-          <p:cNvPr id="30" name="TextBox 29">
-            <a:extLst>
-              <a:ext uri="{FF2B5EF4-FFF2-40B4-BE49-F238E27FC236}">
-                <a16:creationId xmlns:a16="http://schemas.microsoft.com/office/drawing/2014/main" id="{425D1C97-CBC6-2743-A61D-448FE34631A7}"/>
-              </a:ext>
-            </a:extLst>
-          </p:cNvPr>
-          <p:cNvSpPr txBox="1"/>
-          <p:nvPr/>
-        </p:nvSpPr>
-        <p:spPr>
-          <a:xfrm>
-            <a:off x="1638121" y="4720910"/>
-            <a:ext cx="2662908" cy="307777"/>
-          </a:xfrm>
-          <a:prstGeom prst="rect">
-            <a:avLst/>
-          </a:prstGeom>
-          <a:noFill/>
-        </p:spPr>
-        <p:txBody>
-          <a:bodyPr wrap="none" rtlCol="0">
-            <a:spAutoFit/>
-          </a:bodyPr>
-          <a:lstStyle/>
-          <a:p>
-            <a:r>
-              <a:rPr lang="en-US" sz="1400" dirty="0">
-                <a:solidFill>
-                  <a:schemeClr val="bg1"/>
-                </a:solidFill>
-                <a:latin typeface="Arial" panose="020B0604020202020204" pitchFamily="34" charset="0"/>
-                <a:cs typeface="Arial" panose="020B0604020202020204" pitchFamily="34" charset="0"/>
-              </a:rPr>
-              <a:t>Peng et al. </a:t>
-            </a:r>
-            <a:r>
-              <a:rPr lang="en-US" sz="1400" i="1" dirty="0">
-                <a:solidFill>
-                  <a:schemeClr val="bg1"/>
-                </a:solidFill>
-                <a:latin typeface="Arial" panose="020B0604020202020204" pitchFamily="34" charset="0"/>
-                <a:cs typeface="Arial" panose="020B0604020202020204" pitchFamily="34" charset="0"/>
-              </a:rPr>
-              <a:t>Bioinformatics</a:t>
-            </a:r>
-            <a:r>
-              <a:rPr lang="en-US" sz="1400" dirty="0">
-                <a:solidFill>
-                  <a:schemeClr val="bg1"/>
-                </a:solidFill>
-                <a:latin typeface="Arial" panose="020B0604020202020204" pitchFamily="34" charset="0"/>
-                <a:cs typeface="Arial" panose="020B0604020202020204" pitchFamily="34" charset="0"/>
-              </a:rPr>
-              <a:t> 2019</a:t>
-            </a:r>
-            <a:endParaRPr lang="en-US" sz="1400" i="1" dirty="0">
-              <a:solidFill>
-                <a:schemeClr val="bg1"/>
-              </a:solidFill>
-              <a:latin typeface="Arial" panose="020B0604020202020204" pitchFamily="34" charset="0"/>
-              <a:cs typeface="Arial" panose="020B0604020202020204" pitchFamily="34" charset="0"/>
-            </a:endParaRPr>
-          </a:p>
-        </p:txBody>
-      </p:sp>
       <mc:AlternateContent xmlns:mc="http://schemas.openxmlformats.org/markup-compatibility/2006" xmlns:a14="http://schemas.microsoft.com/office/drawing/2010/main">
         <mc:Choice Requires="a14">
           <p:sp>
@@ -13224,6 +13195,64 @@
           </a:prstGeom>
         </p:spPr>
       </p:pic>
+      <p:sp>
+        <p:nvSpPr>
+          <p:cNvPr id="3" name="TextBox 2">
+            <a:extLst>
+              <a:ext uri="{FF2B5EF4-FFF2-40B4-BE49-F238E27FC236}">
+                <a16:creationId xmlns:a16="http://schemas.microsoft.com/office/drawing/2014/main" id="{A32A7C00-CEC8-3835-8998-1FC2CC6B616A}"/>
+              </a:ext>
+            </a:extLst>
+          </p:cNvPr>
+          <p:cNvSpPr txBox="1"/>
+          <p:nvPr/>
+        </p:nvSpPr>
+        <p:spPr>
+          <a:xfrm>
+            <a:off x="1843014" y="4705281"/>
+            <a:ext cx="1717137" cy="307777"/>
+          </a:xfrm>
+          <a:prstGeom prst="rect">
+            <a:avLst/>
+          </a:prstGeom>
+          <a:noFill/>
+        </p:spPr>
+        <p:txBody>
+          <a:bodyPr wrap="none" rtlCol="0">
+            <a:spAutoFit/>
+          </a:bodyPr>
+          <a:lstStyle/>
+          <a:p>
+            <a:r>
+              <a:rPr lang="en-US" sz="1400" dirty="0" err="1">
+                <a:solidFill>
+                  <a:schemeClr val="bg1"/>
+                </a:solidFill>
+                <a:latin typeface="Arial" panose="020B0604020202020204" pitchFamily="34" charset="0"/>
+                <a:cs typeface="Arial" panose="020B0604020202020204" pitchFamily="34" charset="0"/>
+              </a:rPr>
+              <a:t>Scrucca</a:t>
+            </a:r>
+            <a:r>
+              <a:rPr lang="en-US" sz="1400" dirty="0">
+                <a:solidFill>
+                  <a:schemeClr val="bg1"/>
+                </a:solidFill>
+                <a:latin typeface="Arial" panose="020B0604020202020204" pitchFamily="34" charset="0"/>
+                <a:cs typeface="Arial" panose="020B0604020202020204" pitchFamily="34" charset="0"/>
+              </a:rPr>
+              <a:t> et al. 2016</a:t>
+            </a:r>
+            <a:endParaRPr lang="en-US" sz="1400" i="1" dirty="0">
+              <a:solidFill>
+                <a:schemeClr val="bg1"/>
+              </a:solidFill>
+              <a:latin typeface="Arial" panose="020B0604020202020204" pitchFamily="34" charset="0"/>
+              <a:cs typeface="Arial" panose="020B0604020202020204" pitchFamily="34" charset="0"/>
+            </a:endParaRPr>
+          </a:p>
+        </p:txBody>
+      </p:sp>
     </p:spTree>
     <p:extLst>
       <p:ext uri="{BB962C8B-B14F-4D97-AF65-F5344CB8AC3E}">

</xml_diff>